<commit_message>
worked on elevator pitch ppt
</commit_message>
<xml_diff>
--- a/docs/Elevator_Pitch.pptx
+++ b/docs/Elevator_Pitch.pptx
@@ -108,6 +108,11 @@
       </a:defRPr>
     </a:lvl9pPr>
   </p:defaultTextStyle>
+  <p:extLst>
+    <p:ext uri="{EFAFB233-063F-42B5-8137-9DF3F51BA10A}">
+      <p15:sldGuideLst xmlns:p15="http://schemas.microsoft.com/office/powerpoint/2012/main"/>
+    </p:ext>
+  </p:extLst>
 </p:presentation>
 </file>
 
@@ -3325,62 +3330,12 @@
           <a:chExt cx="0" cy="0"/>
         </a:xfrm>
       </p:grpSpPr>
-      <p:sp>
-        <p:nvSpPr>
-          <p:cNvPr id="2" name="Title 1">
-            <a:extLst>
-              <a:ext uri="{FF2B5EF4-FFF2-40B4-BE49-F238E27FC236}">
-                <a16:creationId xmlns:a16="http://schemas.microsoft.com/office/drawing/2014/main" id="{2087CC2B-A810-43A1-93C1-02B9AF372571}"/>
-              </a:ext>
-            </a:extLst>
-          </p:cNvPr>
-          <p:cNvSpPr>
-            <a:spLocks noGrp="1"/>
-          </p:cNvSpPr>
-          <p:nvPr>
-            <p:ph type="ctrTitle"/>
-          </p:nvPr>
-        </p:nvSpPr>
-        <p:spPr/>
-        <p:txBody>
-          <a:bodyPr/>
-          <a:lstStyle/>
-          <a:p>
-            <a:endParaRPr lang="en-US" dirty="0"/>
-          </a:p>
-        </p:txBody>
-      </p:sp>
-      <p:sp>
-        <p:nvSpPr>
-          <p:cNvPr id="3" name="Subtitle 2">
-            <a:extLst>
-              <a:ext uri="{FF2B5EF4-FFF2-40B4-BE49-F238E27FC236}">
-                <a16:creationId xmlns:a16="http://schemas.microsoft.com/office/drawing/2014/main" id="{0D65F42C-AF31-4816-B542-37EA7EE44DF5}"/>
-              </a:ext>
-            </a:extLst>
-          </p:cNvPr>
-          <p:cNvSpPr>
-            <a:spLocks noGrp="1"/>
-          </p:cNvSpPr>
-          <p:nvPr>
-            <p:ph type="subTitle" idx="1"/>
-          </p:nvPr>
-        </p:nvSpPr>
-        <p:spPr/>
-        <p:txBody>
-          <a:bodyPr/>
-          <a:lstStyle/>
-          <a:p>
-            <a:endParaRPr lang="en-US"/>
-          </a:p>
-        </p:txBody>
-      </p:sp>
       <p:pic>
         <p:nvPicPr>
-          <p:cNvPr id="7" name="Picture 6">
-            <a:extLst>
-              <a:ext uri="{FF2B5EF4-FFF2-40B4-BE49-F238E27FC236}">
-                <a16:creationId xmlns:a16="http://schemas.microsoft.com/office/drawing/2014/main" id="{07364178-534C-4435-8C12-B0BC38697F4C}"/>
+          <p:cNvPr id="5" name="Picture 4" descr="Graphical user interface, text&#10;&#10;Description automatically generated">
+            <a:extLst>
+              <a:ext uri="{FF2B5EF4-FFF2-40B4-BE49-F238E27FC236}">
+                <a16:creationId xmlns:a16="http://schemas.microsoft.com/office/drawing/2014/main" id="{72E547C7-2314-4B58-AED3-F54EDD146C82}"/>
               </a:ext>
             </a:extLst>
           </p:cNvPr>
@@ -3390,51 +3345,116 @@
           <p:nvPr/>
         </p:nvPicPr>
         <p:blipFill>
-          <a:blip r:embed="rId2"/>
+          <a:blip r:embed="rId2">
+            <a:extLst>
+              <a:ext uri="{28A0092B-C50C-407E-A947-70E740481C1C}">
+                <a14:useLocalDpi xmlns:a14="http://schemas.microsoft.com/office/drawing/2010/main" val="0"/>
+              </a:ext>
+            </a:extLst>
+          </a:blip>
           <a:stretch>
             <a:fillRect/>
           </a:stretch>
         </p:blipFill>
         <p:spPr>
           <a:xfrm>
-            <a:off x="1524000" y="0"/>
-            <a:ext cx="9307901" cy="6858000"/>
+            <a:off x="0" y="195166"/>
+            <a:ext cx="12192000" cy="6467668"/>
           </a:xfrm>
           <a:prstGeom prst="rect">
             <a:avLst/>
           </a:prstGeom>
         </p:spPr>
       </p:pic>
-      <p:pic>
-        <p:nvPicPr>
-          <p:cNvPr id="10" name="Picture 9">
-            <a:extLst>
-              <a:ext uri="{FF2B5EF4-FFF2-40B4-BE49-F238E27FC236}">
-                <a16:creationId xmlns:a16="http://schemas.microsoft.com/office/drawing/2014/main" id="{88266CC7-2383-4203-801D-D8FB3048AA3B}"/>
-              </a:ext>
-            </a:extLst>
-          </p:cNvPr>
-          <p:cNvPicPr>
-            <a:picLocks noChangeAspect="1"/>
-          </p:cNvPicPr>
-          <p:nvPr/>
-        </p:nvPicPr>
-        <p:blipFill>
-          <a:blip r:embed="rId3"/>
-          <a:stretch>
-            <a:fillRect/>
-          </a:stretch>
-        </p:blipFill>
+      <p:sp>
+        <p:nvSpPr>
+          <p:cNvPr id="2" name="Title 1">
+            <a:extLst>
+              <a:ext uri="{FF2B5EF4-FFF2-40B4-BE49-F238E27FC236}">
+                <a16:creationId xmlns:a16="http://schemas.microsoft.com/office/drawing/2014/main" id="{2087CC2B-A810-43A1-93C1-02B9AF372571}"/>
+              </a:ext>
+            </a:extLst>
+          </p:cNvPr>
+          <p:cNvSpPr>
+            <a:spLocks noGrp="1"/>
+          </p:cNvSpPr>
+          <p:nvPr>
+            <p:ph type="ctrTitle"/>
+          </p:nvPr>
+        </p:nvSpPr>
         <p:spPr>
           <a:xfrm>
-            <a:off x="3540473" y="3938535"/>
-            <a:ext cx="4915586" cy="371527"/>
+            <a:off x="1524000" y="1122363"/>
+            <a:ext cx="9144000" cy="1239097"/>
           </a:xfrm>
-          <a:prstGeom prst="rect">
-            <a:avLst/>
-          </a:prstGeom>
         </p:spPr>
-      </p:pic>
+        <p:txBody>
+          <a:bodyPr>
+            <a:scene3d>
+              <a:camera prst="orthographicFront"/>
+              <a:lightRig rig="harsh" dir="t"/>
+            </a:scene3d>
+            <a:sp3d extrusionH="57150" prstMaterial="matte">
+              <a:bevelT w="63500" h="12700" prst="angle"/>
+              <a:contourClr>
+                <a:schemeClr val="bg1">
+                  <a:lumMod val="65000"/>
+                </a:schemeClr>
+              </a:contourClr>
+            </a:sp3d>
+          </a:bodyPr>
+          <a:lstStyle/>
+          <a:p>
+            <a:r>
+              <a:rPr lang="en-US" b="1" dirty="0">
+                <a:ln/>
+                <a:solidFill>
+                  <a:schemeClr val="accent3"/>
+                </a:solidFill>
+              </a:rPr>
+              <a:t>TEAM STONKS</a:t>
+            </a:r>
+          </a:p>
+        </p:txBody>
+      </p:sp>
+      <p:sp>
+        <p:nvSpPr>
+          <p:cNvPr id="3" name="Subtitle 2">
+            <a:extLst>
+              <a:ext uri="{FF2B5EF4-FFF2-40B4-BE49-F238E27FC236}">
+                <a16:creationId xmlns:a16="http://schemas.microsoft.com/office/drawing/2014/main" id="{0D65F42C-AF31-4816-B542-37EA7EE44DF5}"/>
+              </a:ext>
+            </a:extLst>
+          </p:cNvPr>
+          <p:cNvSpPr>
+            <a:spLocks noGrp="1"/>
+          </p:cNvSpPr>
+          <p:nvPr>
+            <p:ph type="subTitle" idx="1"/>
+          </p:nvPr>
+        </p:nvSpPr>
+        <p:spPr>
+          <a:xfrm>
+            <a:off x="1524000" y="5626150"/>
+            <a:ext cx="9144000" cy="1655762"/>
+          </a:xfrm>
+        </p:spPr>
+        <p:txBody>
+          <a:bodyPr/>
+          <a:lstStyle/>
+          <a:p>
+            <a:r>
+              <a:rPr lang="en-US" b="1" dirty="0"/>
+              <a:t>Alec DeVries, Chase Kinard, Chase Mulder, Simon </a:t>
+            </a:r>
+            <a:r>
+              <a:rPr lang="en-US" b="1" dirty="0" err="1"/>
+              <a:t>Hillebrands</a:t>
+            </a:r>
+            <a:endParaRPr lang="en-US" b="1" dirty="0"/>
+          </a:p>
+        </p:txBody>
+      </p:sp>
     </p:spTree>
     <p:extLst>
       <p:ext uri="{BB962C8B-B14F-4D97-AF65-F5344CB8AC3E}">
@@ -3451,6 +3471,14 @@
 <file path=ppt/slides/slide2.xml><?xml version="1.0" encoding="utf-8"?>
 <p:sld xmlns:a="http://schemas.openxmlformats.org/drawingml/2006/main" xmlns:r="http://schemas.openxmlformats.org/officeDocument/2006/relationships" xmlns:p="http://schemas.openxmlformats.org/presentationml/2006/main">
   <p:cSld>
+    <p:bg>
+      <p:bgPr>
+        <a:solidFill>
+          <a:schemeClr val="bg1"/>
+        </a:solidFill>
+        <a:effectLst/>
+      </p:bgPr>
+    </p:bg>
     <p:spTree>
       <p:nvGrpSpPr>
         <p:cNvPr id="1" name=""/>
@@ -3465,107 +3493,414 @@
           <a:chExt cx="0" cy="0"/>
         </a:xfrm>
       </p:grpSpPr>
-      <p:sp>
-        <p:nvSpPr>
-          <p:cNvPr id="2" name="Title 1">
-            <a:extLst>
-              <a:ext uri="{FF2B5EF4-FFF2-40B4-BE49-F238E27FC236}">
-                <a16:creationId xmlns:a16="http://schemas.microsoft.com/office/drawing/2014/main" id="{8667E309-4AD7-4ABB-8FA2-8AAF953FCC43}"/>
-              </a:ext>
-            </a:extLst>
-          </p:cNvPr>
-          <p:cNvSpPr>
-            <a:spLocks noGrp="1"/>
-          </p:cNvSpPr>
-          <p:nvPr>
-            <p:ph type="title"/>
-          </p:nvPr>
-        </p:nvSpPr>
-        <p:spPr/>
-        <p:txBody>
-          <a:bodyPr/>
-          <a:lstStyle/>
-          <a:p>
-            <a:endParaRPr lang="en-US"/>
-          </a:p>
-        </p:txBody>
-      </p:sp>
-      <p:pic>
-        <p:nvPicPr>
-          <p:cNvPr id="5" name="Content Placeholder 4">
-            <a:extLst>
-              <a:ext uri="{FF2B5EF4-FFF2-40B4-BE49-F238E27FC236}">
-                <a16:creationId xmlns:a16="http://schemas.microsoft.com/office/drawing/2014/main" id="{15945A03-5869-455F-8504-7F332793CFAE}"/>
-              </a:ext>
-            </a:extLst>
-          </p:cNvPr>
-          <p:cNvPicPr>
-            <a:picLocks noGrp="1" noChangeAspect="1"/>
-          </p:cNvPicPr>
-          <p:nvPr>
-            <p:ph idx="1"/>
-          </p:nvPr>
-        </p:nvPicPr>
-        <p:blipFill>
-          <a:blip r:embed="rId2"/>
-          <a:stretch>
-            <a:fillRect/>
-          </a:stretch>
-        </p:blipFill>
+      <p:sp useBgFill="1">
+        <p:nvSpPr>
+          <p:cNvPr id="17" name="Rectangle 16">
+            <a:extLst>
+              <a:ext uri="{FF2B5EF4-FFF2-40B4-BE49-F238E27FC236}">
+                <a16:creationId xmlns:a16="http://schemas.microsoft.com/office/drawing/2014/main" id="{8FC9BE17-9A7B-462D-AE50-3D8777387304}"/>
+              </a:ext>
+              <a:ext uri="{C183D7F6-B498-43B3-948B-1728B52AA6E4}">
+                <adec:decorative xmlns:adec="http://schemas.microsoft.com/office/drawing/2017/decorative" val="1"/>
+              </a:ext>
+            </a:extLst>
+          </p:cNvPr>
+          <p:cNvSpPr>
+            <a:spLocks noGrp="1" noRot="1" noChangeAspect="1" noMove="1" noResize="1" noEditPoints="1" noAdjustHandles="1" noChangeArrowheads="1" noChangeShapeType="1" noTextEdit="1"/>
+          </p:cNvSpPr>
+          <p:nvPr>
+            <p:extLst>
+              <p:ext uri="{386F3935-93C4-4BCD-93E2-E3B085C9AB24}">
+                <p16:designElem xmlns:p16="http://schemas.microsoft.com/office/powerpoint/2015/main" val="1"/>
+              </p:ext>
+            </p:extLst>
+          </p:nvPr>
+        </p:nvSpPr>
         <p:spPr>
           <a:xfrm>
-            <a:off x="620109" y="-34563"/>
-            <a:ext cx="11256579" cy="6927126"/>
-          </a:xfrm>
-        </p:spPr>
-      </p:pic>
-      <p:sp>
-        <p:nvSpPr>
-          <p:cNvPr id="6" name="Rectangle 5">
-            <a:extLst>
-              <a:ext uri="{FF2B5EF4-FFF2-40B4-BE49-F238E27FC236}">
-                <a16:creationId xmlns:a16="http://schemas.microsoft.com/office/drawing/2014/main" id="{739987C4-6B3D-43BD-A6AB-6B5FF39CCDCB}"/>
-              </a:ext>
-            </a:extLst>
-          </p:cNvPr>
-          <p:cNvSpPr/>
-          <p:nvPr/>
-        </p:nvSpPr>
-        <p:spPr>
-          <a:xfrm>
-            <a:off x="838200" y="1979363"/>
-            <a:ext cx="8681545" cy="1862048"/>
+            <a:off x="0" y="0"/>
+            <a:ext cx="12192000" cy="6858000"/>
           </a:xfrm>
           <a:prstGeom prst="rect">
             <a:avLst/>
           </a:prstGeom>
-          <a:noFill/>
+          <a:ln>
+            <a:noFill/>
+          </a:ln>
         </p:spPr>
-        <p:txBody>
-          <a:bodyPr wrap="square" lIns="91440" tIns="45720" rIns="91440" bIns="45720">
-            <a:spAutoFit/>
+        <p:style>
+          <a:lnRef idx="2">
+            <a:schemeClr val="accent1">
+              <a:shade val="50000"/>
+            </a:schemeClr>
+          </a:lnRef>
+          <a:fillRef idx="1">
+            <a:schemeClr val="accent1"/>
+          </a:fillRef>
+          <a:effectRef idx="0">
+            <a:schemeClr val="accent1"/>
+          </a:effectRef>
+          <a:fontRef idx="minor">
+            <a:schemeClr val="lt1"/>
+          </a:fontRef>
+        </p:style>
+        <p:txBody>
+          <a:bodyPr rtlCol="0" anchor="ctr"/>
+          <a:lstStyle/>
+          <a:p>
+            <a:pPr algn="ctr"/>
+            <a:endParaRPr lang="en-US"/>
+          </a:p>
+        </p:txBody>
+      </p:sp>
+      <p:pic>
+        <p:nvPicPr>
+          <p:cNvPr id="10" name="Content Placeholder 9" descr="A picture containing electronics, circuit&#10;&#10;Description automatically generated">
+            <a:extLst>
+              <a:ext uri="{FF2B5EF4-FFF2-40B4-BE49-F238E27FC236}">
+                <a16:creationId xmlns:a16="http://schemas.microsoft.com/office/drawing/2014/main" id="{94B130E2-6176-4D81-947E-64B25DA3DF06}"/>
+              </a:ext>
+            </a:extLst>
+          </p:cNvPr>
+          <p:cNvPicPr>
+            <a:picLocks noChangeAspect="1"/>
+          </p:cNvPicPr>
+          <p:nvPr/>
+        </p:nvPicPr>
+        <p:blipFill rotWithShape="1">
+          <a:blip r:embed="rId2">
+            <a:extLst>
+              <a:ext uri="{28A0092B-C50C-407E-A947-70E740481C1C}">
+                <a14:useLocalDpi xmlns:a14="http://schemas.microsoft.com/office/drawing/2010/main" val="0"/>
+              </a:ext>
+            </a:extLst>
+          </a:blip>
+          <a:srcRect t="9816" r="9089" b="-2"/>
+          <a:stretch/>
+        </p:blipFill>
+        <p:spPr>
+          <a:xfrm>
+            <a:off x="3564128" y="-40630"/>
+            <a:ext cx="8668512" cy="6857990"/>
+          </a:xfrm>
+          <a:prstGeom prst="rect">
+            <a:avLst/>
+          </a:prstGeom>
+        </p:spPr>
+      </p:pic>
+      <p:sp>
+        <p:nvSpPr>
+          <p:cNvPr id="19" name="Rectangle 18">
+            <a:extLst>
+              <a:ext uri="{FF2B5EF4-FFF2-40B4-BE49-F238E27FC236}">
+                <a16:creationId xmlns:a16="http://schemas.microsoft.com/office/drawing/2014/main" id="{3EBE8569-6AEC-4B8C-8D53-2DE337CDBA65}"/>
+              </a:ext>
+              <a:ext uri="{C183D7F6-B498-43B3-948B-1728B52AA6E4}">
+                <adec:decorative xmlns:adec="http://schemas.microsoft.com/office/drawing/2017/decorative" val="1"/>
+              </a:ext>
+            </a:extLst>
+          </p:cNvPr>
+          <p:cNvSpPr>
+            <a:spLocks noGrp="1" noRot="1" noChangeAspect="1" noMove="1" noResize="1" noEditPoints="1" noAdjustHandles="1" noChangeArrowheads="1" noChangeShapeType="1" noTextEdit="1"/>
+          </p:cNvSpPr>
+          <p:nvPr>
+            <p:extLst>
+              <p:ext uri="{386F3935-93C4-4BCD-93E2-E3B085C9AB24}">
+                <p16:designElem xmlns:p16="http://schemas.microsoft.com/office/powerpoint/2015/main" val="1"/>
+              </p:ext>
+            </p:extLst>
+          </p:nvPr>
+        </p:nvSpPr>
+        <p:spPr>
+          <a:xfrm>
+            <a:off x="2" y="0"/>
+            <a:ext cx="9756601" cy="6858000"/>
+          </a:xfrm>
+          <a:prstGeom prst="rect">
+            <a:avLst/>
+          </a:prstGeom>
+          <a:gradFill>
+            <a:gsLst>
+              <a:gs pos="58000">
+                <a:schemeClr val="bg1"/>
+              </a:gs>
+              <a:gs pos="35000">
+                <a:schemeClr val="bg1">
+                  <a:alpha val="78000"/>
+                </a:schemeClr>
+              </a:gs>
+              <a:gs pos="19000">
+                <a:schemeClr val="bg1">
+                  <a:alpha val="38000"/>
+                </a:schemeClr>
+              </a:gs>
+              <a:gs pos="0">
+                <a:schemeClr val="bg1">
+                  <a:alpha val="0"/>
+                </a:schemeClr>
+              </a:gs>
+              <a:gs pos="100000">
+                <a:schemeClr val="bg1"/>
+              </a:gs>
+            </a:gsLst>
+            <a:lin ang="10800000" scaled="0"/>
+          </a:gradFill>
+          <a:ln>
+            <a:noFill/>
+          </a:ln>
+        </p:spPr>
+        <p:style>
+          <a:lnRef idx="2">
+            <a:schemeClr val="accent1">
+              <a:shade val="50000"/>
+            </a:schemeClr>
+          </a:lnRef>
+          <a:fillRef idx="1">
+            <a:schemeClr val="accent1"/>
+          </a:fillRef>
+          <a:effectRef idx="0">
+            <a:schemeClr val="accent1"/>
+          </a:effectRef>
+          <a:fontRef idx="minor">
+            <a:schemeClr val="lt1"/>
+          </a:fontRef>
+        </p:style>
+        <p:txBody>
+          <a:bodyPr rtlCol="0" anchor="ctr"/>
+          <a:lstStyle/>
+          <a:p>
+            <a:pPr algn="ctr"/>
+            <a:endParaRPr lang="en-US" dirty="0"/>
+          </a:p>
+        </p:txBody>
+      </p:sp>
+      <p:sp>
+        <p:nvSpPr>
+          <p:cNvPr id="2" name="Title 1">
+            <a:extLst>
+              <a:ext uri="{FF2B5EF4-FFF2-40B4-BE49-F238E27FC236}">
+                <a16:creationId xmlns:a16="http://schemas.microsoft.com/office/drawing/2014/main" id="{8667E309-4AD7-4ABB-8FA2-8AAF953FCC43}"/>
+              </a:ext>
+            </a:extLst>
+          </p:cNvPr>
+          <p:cNvSpPr>
+            <a:spLocks noGrp="1"/>
+          </p:cNvSpPr>
+          <p:nvPr>
+            <p:ph type="title"/>
+          </p:nvPr>
+        </p:nvSpPr>
+        <p:spPr>
+          <a:xfrm>
+            <a:off x="371094" y="1161288"/>
+            <a:ext cx="3438144" cy="1124712"/>
+          </a:xfrm>
+        </p:spPr>
+        <p:txBody>
+          <a:bodyPr anchor="b">
+            <a:normAutofit/>
           </a:bodyPr>
           <a:lstStyle/>
           <a:p>
+            <a:r>
+              <a:rPr lang="en-US" sz="2800" dirty="0"/>
+              <a:t>Raspberry Pi-based Stock Ticker</a:t>
+            </a:r>
+          </a:p>
+        </p:txBody>
+      </p:sp>
+      <p:sp>
+        <p:nvSpPr>
+          <p:cNvPr id="21" name="Rectangle 20">
+            <a:extLst>
+              <a:ext uri="{FF2B5EF4-FFF2-40B4-BE49-F238E27FC236}">
+                <a16:creationId xmlns:a16="http://schemas.microsoft.com/office/drawing/2014/main" id="{55D4142C-5077-457F-A6AD-3FECFDB39685}"/>
+              </a:ext>
+              <a:ext uri="{C183D7F6-B498-43B3-948B-1728B52AA6E4}">
+                <adec:decorative xmlns:adec="http://schemas.microsoft.com/office/drawing/2017/decorative" val="1"/>
+              </a:ext>
+            </a:extLst>
+          </p:cNvPr>
+          <p:cNvSpPr>
+            <a:spLocks noGrp="1" noRot="1" noChangeAspect="1" noMove="1" noResize="1" noEditPoints="1" noAdjustHandles="1" noChangeArrowheads="1" noChangeShapeType="1" noTextEdit="1"/>
+          </p:cNvSpPr>
+          <p:nvPr>
+            <p:extLst>
+              <p:ext uri="{386F3935-93C4-4BCD-93E2-E3B085C9AB24}">
+                <p16:designElem xmlns:p16="http://schemas.microsoft.com/office/powerpoint/2015/main" val="1"/>
+              </p:ext>
+            </p:extLst>
+          </p:nvPr>
+        </p:nvSpPr>
+        <p:spPr>
+          <a:xfrm rot="5400000">
+            <a:off x="662559" y="605790"/>
+            <a:ext cx="73152" cy="548640"/>
+          </a:xfrm>
+          <a:prstGeom prst="rect">
+            <a:avLst/>
+          </a:prstGeom>
+          <a:solidFill>
+            <a:schemeClr val="accent2"/>
+          </a:solidFill>
+          <a:ln>
+            <a:noFill/>
+          </a:ln>
+        </p:spPr>
+        <p:style>
+          <a:lnRef idx="2">
+            <a:schemeClr val="accent1">
+              <a:shade val="50000"/>
+            </a:schemeClr>
+          </a:lnRef>
+          <a:fillRef idx="1">
+            <a:schemeClr val="accent1"/>
+          </a:fillRef>
+          <a:effectRef idx="0">
+            <a:schemeClr val="accent1"/>
+          </a:effectRef>
+          <a:fontRef idx="minor">
+            <a:schemeClr val="lt1"/>
+          </a:fontRef>
+        </p:style>
+        <p:txBody>
+          <a:bodyPr rtlCol="0" anchor="ctr"/>
+          <a:lstStyle/>
+          <a:p>
             <a:pPr algn="ctr"/>
-            <a:r>
-              <a:rPr lang="en-US" sz="11500" b="1" cap="none" spc="0" dirty="0">
-                <a:ln w="22225">
-                  <a:solidFill>
-                    <a:schemeClr val="accent2"/>
-                  </a:solidFill>
-                  <a:prstDash val="solid"/>
-                </a:ln>
-                <a:solidFill>
-                  <a:schemeClr val="accent2">
-                    <a:lumMod val="40000"/>
-                    <a:lumOff val="60000"/>
-                  </a:schemeClr>
-                </a:solidFill>
-                <a:effectLst/>
-              </a:rPr>
-              <a:t>Raspberry Pi</a:t>
-            </a:r>
+            <a:endParaRPr lang="en-US">
+              <a:solidFill>
+                <a:prstClr val="white"/>
+              </a:solidFill>
+              <a:latin typeface="Calibri" panose="020F0502020204030204"/>
+            </a:endParaRPr>
+          </a:p>
+        </p:txBody>
+      </p:sp>
+      <p:sp>
+        <p:nvSpPr>
+          <p:cNvPr id="23" name="Rectangle 22">
+            <a:extLst>
+              <a:ext uri="{FF2B5EF4-FFF2-40B4-BE49-F238E27FC236}">
+                <a16:creationId xmlns:a16="http://schemas.microsoft.com/office/drawing/2014/main" id="{7A5F0580-5EE9-419F-96EE-B6529EF6E7D0}"/>
+              </a:ext>
+              <a:ext uri="{C183D7F6-B498-43B3-948B-1728B52AA6E4}">
+                <adec:decorative xmlns:adec="http://schemas.microsoft.com/office/drawing/2017/decorative" val="1"/>
+              </a:ext>
+            </a:extLst>
+          </p:cNvPr>
+          <p:cNvSpPr>
+            <a:spLocks noGrp="1" noRot="1" noChangeAspect="1" noMove="1" noResize="1" noEditPoints="1" noAdjustHandles="1" noChangeArrowheads="1" noChangeShapeType="1" noTextEdit="1"/>
+          </p:cNvSpPr>
+          <p:nvPr>
+            <p:extLst>
+              <p:ext uri="{386F3935-93C4-4BCD-93E2-E3B085C9AB24}">
+                <p16:designElem xmlns:p16="http://schemas.microsoft.com/office/powerpoint/2015/main" val="1"/>
+              </p:ext>
+            </p:extLst>
+          </p:nvPr>
+        </p:nvSpPr>
+        <p:spPr>
+          <a:xfrm>
+            <a:off x="428244" y="2443480"/>
+            <a:ext cx="3300984" cy="9144"/>
+          </a:xfrm>
+          <a:prstGeom prst="rect">
+            <a:avLst/>
+          </a:prstGeom>
+          <a:solidFill>
+            <a:srgbClr val="D5D5D5"/>
+          </a:solidFill>
+          <a:ln w="3175">
+            <a:solidFill>
+              <a:srgbClr val="D5D5D5"/>
+            </a:solidFill>
+          </a:ln>
+          <a:effectLst/>
+        </p:spPr>
+        <p:style>
+          <a:lnRef idx="2">
+            <a:schemeClr val="accent1">
+              <a:shade val="50000"/>
+            </a:schemeClr>
+          </a:lnRef>
+          <a:fillRef idx="1">
+            <a:schemeClr val="accent1"/>
+          </a:fillRef>
+          <a:effectRef idx="0">
+            <a:schemeClr val="accent1"/>
+          </a:effectRef>
+          <a:fontRef idx="minor">
+            <a:schemeClr val="lt1"/>
+          </a:fontRef>
+        </p:style>
+        <p:txBody>
+          <a:bodyPr rtlCol="0" anchor="ctr"/>
+          <a:lstStyle/>
+          <a:p>
+            <a:pPr marL="0" marR="0" lvl="0" indent="0" algn="ctr" defTabSz="914400" rtl="0" eaLnBrk="1" fontAlgn="auto" latinLnBrk="0" hangingPunct="1">
+              <a:lnSpc>
+                <a:spcPct val="100000"/>
+              </a:lnSpc>
+              <a:spcBef>
+                <a:spcPts val="0"/>
+              </a:spcBef>
+              <a:spcAft>
+                <a:spcPts val="0"/>
+              </a:spcAft>
+              <a:buClrTx/>
+              <a:buSzTx/>
+              <a:buFontTx/>
+              <a:buNone/>
+              <a:tabLst/>
+              <a:defRPr/>
+            </a:pPr>
+            <a:endParaRPr kumimoji="0" lang="en-US" sz="1800" b="0" i="0" u="none" strike="noStrike" kern="1200" cap="none" spc="0" normalizeH="0" baseline="0" noProof="0">
+              <a:ln>
+                <a:noFill/>
+              </a:ln>
+              <a:solidFill>
+                <a:prstClr val="white"/>
+              </a:solidFill>
+              <a:effectLst/>
+              <a:uLnTx/>
+              <a:uFillTx/>
+              <a:latin typeface="Calibri" panose="020F0502020204030204"/>
+              <a:ea typeface="+mn-ea"/>
+              <a:cs typeface="+mn-cs"/>
+            </a:endParaRPr>
+          </a:p>
+        </p:txBody>
+      </p:sp>
+      <p:sp>
+        <p:nvSpPr>
+          <p:cNvPr id="14" name="Content Placeholder 13">
+            <a:extLst>
+              <a:ext uri="{FF2B5EF4-FFF2-40B4-BE49-F238E27FC236}">
+                <a16:creationId xmlns:a16="http://schemas.microsoft.com/office/drawing/2014/main" id="{D4135243-944E-41E6-84D4-1742B92C5526}"/>
+              </a:ext>
+            </a:extLst>
+          </p:cNvPr>
+          <p:cNvSpPr>
+            <a:spLocks noGrp="1"/>
+          </p:cNvSpPr>
+          <p:nvPr>
+            <p:ph idx="1"/>
+          </p:nvPr>
+        </p:nvSpPr>
+        <p:spPr>
+          <a:xfrm>
+            <a:off x="371094" y="2718054"/>
+            <a:ext cx="3438906" cy="3207258"/>
+          </a:xfrm>
+        </p:spPr>
+        <p:txBody>
+          <a:bodyPr anchor="t">
+            <a:normAutofit/>
+          </a:bodyPr>
+          <a:lstStyle/>
+          <a:p>
+            <a:endParaRPr lang="en-US" sz="1700"/>
           </a:p>
         </p:txBody>
       </p:sp>
@@ -3585,6 +3920,14 @@
 <file path=ppt/slides/slide3.xml><?xml version="1.0" encoding="utf-8"?>
 <p:sld xmlns:a="http://schemas.openxmlformats.org/drawingml/2006/main" xmlns:r="http://schemas.openxmlformats.org/officeDocument/2006/relationships" xmlns:p="http://schemas.openxmlformats.org/presentationml/2006/main">
   <p:cSld>
+    <p:bg>
+      <p:bgPr>
+        <a:solidFill>
+          <a:schemeClr val="bg1"/>
+        </a:solidFill>
+        <a:effectLst/>
+      </p:bgPr>
+    </p:bg>
     <p:spTree>
       <p:nvGrpSpPr>
         <p:cNvPr id="1" name=""/>
@@ -3599,6 +3942,401 @@
           <a:chExt cx="0" cy="0"/>
         </a:xfrm>
       </p:grpSpPr>
+      <p:sp useBgFill="1">
+        <p:nvSpPr>
+          <p:cNvPr id="15" name="Rectangle 14">
+            <a:extLst>
+              <a:ext uri="{FF2B5EF4-FFF2-40B4-BE49-F238E27FC236}">
+                <a16:creationId xmlns:a16="http://schemas.microsoft.com/office/drawing/2014/main" id="{5C9B446A-6343-4E56-90BA-061E4DDF0FFB}"/>
+              </a:ext>
+              <a:ext uri="{C183D7F6-B498-43B3-948B-1728B52AA6E4}">
+                <adec:decorative xmlns:adec="http://schemas.microsoft.com/office/drawing/2017/decorative" val="1"/>
+              </a:ext>
+            </a:extLst>
+          </p:cNvPr>
+          <p:cNvSpPr>
+            <a:spLocks noGrp="1" noRot="1" noChangeAspect="1" noMove="1" noResize="1" noEditPoints="1" noAdjustHandles="1" noChangeArrowheads="1" noChangeShapeType="1" noTextEdit="1"/>
+          </p:cNvSpPr>
+          <p:nvPr>
+            <p:extLst>
+              <p:ext uri="{386F3935-93C4-4BCD-93E2-E3B085C9AB24}">
+                <p16:designElem xmlns:p16="http://schemas.microsoft.com/office/powerpoint/2015/main" val="1"/>
+              </p:ext>
+            </p:extLst>
+          </p:nvPr>
+        </p:nvSpPr>
+        <p:spPr>
+          <a:xfrm>
+            <a:off x="0" y="0"/>
+            <a:ext cx="12192000" cy="6858000"/>
+          </a:xfrm>
+          <a:prstGeom prst="rect">
+            <a:avLst/>
+          </a:prstGeom>
+          <a:ln>
+            <a:noFill/>
+          </a:ln>
+        </p:spPr>
+        <p:style>
+          <a:lnRef idx="2">
+            <a:schemeClr val="accent1">
+              <a:shade val="50000"/>
+            </a:schemeClr>
+          </a:lnRef>
+          <a:fillRef idx="1">
+            <a:schemeClr val="accent1"/>
+          </a:fillRef>
+          <a:effectRef idx="0">
+            <a:schemeClr val="accent1"/>
+          </a:effectRef>
+          <a:fontRef idx="minor">
+            <a:schemeClr val="lt1"/>
+          </a:fontRef>
+        </p:style>
+        <p:txBody>
+          <a:bodyPr rtlCol="0" anchor="ctr"/>
+          <a:lstStyle/>
+          <a:p>
+            <a:pPr algn="ctr"/>
+            <a:endParaRPr lang="en-US"/>
+          </a:p>
+        </p:txBody>
+      </p:sp>
+      <p:sp useBgFill="1">
+        <p:nvSpPr>
+          <p:cNvPr id="17" name="Freeform: Shape 16">
+            <a:extLst>
+              <a:ext uri="{FF2B5EF4-FFF2-40B4-BE49-F238E27FC236}">
+                <a16:creationId xmlns:a16="http://schemas.microsoft.com/office/drawing/2014/main" id="{3EC72A1B-03D3-499C-B4BF-AC68EEC22B10}"/>
+              </a:ext>
+              <a:ext uri="{C183D7F6-B498-43B3-948B-1728B52AA6E4}">
+                <adec:decorative xmlns:adec="http://schemas.microsoft.com/office/drawing/2017/decorative" val="1"/>
+              </a:ext>
+            </a:extLst>
+          </p:cNvPr>
+          <p:cNvSpPr>
+            <a:spLocks noGrp="1" noRot="1" noChangeAspect="1" noMove="1" noResize="1" noEditPoints="1" noAdjustHandles="1" noChangeArrowheads="1" noChangeShapeType="1" noTextEdit="1"/>
+          </p:cNvSpPr>
+          <p:nvPr>
+            <p:extLst>
+              <p:ext uri="{386F3935-93C4-4BCD-93E2-E3B085C9AB24}">
+                <p16:designElem xmlns:p16="http://schemas.microsoft.com/office/powerpoint/2015/main" val="1"/>
+              </p:ext>
+            </p:extLst>
+          </p:nvPr>
+        </p:nvSpPr>
+        <p:spPr>
+          <a:xfrm>
+            <a:off x="-1" y="0"/>
+            <a:ext cx="4455673" cy="6858000"/>
+          </a:xfrm>
+          <a:custGeom>
+            <a:avLst/>
+            <a:gdLst>
+              <a:gd name="connsiteX0" fmla="*/ 0 w 4455673"/>
+              <a:gd name="connsiteY0" fmla="*/ 0 h 6858000"/>
+              <a:gd name="connsiteX1" fmla="*/ 3242695 w 4455673"/>
+              <a:gd name="connsiteY1" fmla="*/ 0 h 6858000"/>
+              <a:gd name="connsiteX2" fmla="*/ 3305678 w 4455673"/>
+              <a:gd name="connsiteY2" fmla="*/ 69271 h 6858000"/>
+              <a:gd name="connsiteX3" fmla="*/ 4455673 w 4455673"/>
+              <a:gd name="connsiteY3" fmla="*/ 3429000 h 6858000"/>
+              <a:gd name="connsiteX4" fmla="*/ 3305678 w 4455673"/>
+              <a:gd name="connsiteY4" fmla="*/ 6788730 h 6858000"/>
+              <a:gd name="connsiteX5" fmla="*/ 3242695 w 4455673"/>
+              <a:gd name="connsiteY5" fmla="*/ 6858000 h 6858000"/>
+              <a:gd name="connsiteX6" fmla="*/ 0 w 4455673"/>
+              <a:gd name="connsiteY6" fmla="*/ 6858000 h 6858000"/>
+            </a:gdLst>
+            <a:ahLst/>
+            <a:cxnLst>
+              <a:cxn ang="0">
+                <a:pos x="connsiteX0" y="connsiteY0"/>
+              </a:cxn>
+              <a:cxn ang="0">
+                <a:pos x="connsiteX1" y="connsiteY1"/>
+              </a:cxn>
+              <a:cxn ang="0">
+                <a:pos x="connsiteX2" y="connsiteY2"/>
+              </a:cxn>
+              <a:cxn ang="0">
+                <a:pos x="connsiteX3" y="connsiteY3"/>
+              </a:cxn>
+              <a:cxn ang="0">
+                <a:pos x="connsiteX4" y="connsiteY4"/>
+              </a:cxn>
+              <a:cxn ang="0">
+                <a:pos x="connsiteX5" y="connsiteY5"/>
+              </a:cxn>
+              <a:cxn ang="0">
+                <a:pos x="connsiteX6" y="connsiteY6"/>
+              </a:cxn>
+            </a:cxnLst>
+            <a:rect l="l" t="t" r="r" b="b"/>
+            <a:pathLst>
+              <a:path w="4455673" h="6858000">
+                <a:moveTo>
+                  <a:pt x="0" y="0"/>
+                </a:moveTo>
+                <a:lnTo>
+                  <a:pt x="3242695" y="0"/>
+                </a:lnTo>
+                <a:lnTo>
+                  <a:pt x="3305678" y="69271"/>
+                </a:lnTo>
+                <a:cubicBezTo>
+                  <a:pt x="4016204" y="929100"/>
+                  <a:pt x="4455673" y="2116944"/>
+                  <a:pt x="4455673" y="3429000"/>
+                </a:cubicBezTo>
+                <a:cubicBezTo>
+                  <a:pt x="4455673" y="4741056"/>
+                  <a:pt x="4016204" y="5928900"/>
+                  <a:pt x="3305678" y="6788730"/>
+                </a:cubicBezTo>
+                <a:lnTo>
+                  <a:pt x="3242695" y="6858000"/>
+                </a:lnTo>
+                <a:lnTo>
+                  <a:pt x="0" y="6858000"/>
+                </a:lnTo>
+                <a:close/>
+              </a:path>
+            </a:pathLst>
+          </a:custGeom>
+          <a:ln w="9525">
+            <a:solidFill>
+              <a:srgbClr val="EFEFEF"/>
+            </a:solidFill>
+          </a:ln>
+          <a:effectLst>
+            <a:outerShdw blurRad="88900" dist="38100" algn="l" rotWithShape="0">
+              <a:schemeClr val="bg1">
+                <a:lumMod val="85000"/>
+                <a:alpha val="50000"/>
+              </a:schemeClr>
+            </a:outerShdw>
+          </a:effectLst>
+        </p:spPr>
+        <p:style>
+          <a:lnRef idx="2">
+            <a:schemeClr val="accent1">
+              <a:shade val="50000"/>
+            </a:schemeClr>
+          </a:lnRef>
+          <a:fillRef idx="1">
+            <a:schemeClr val="accent1"/>
+          </a:fillRef>
+          <a:effectRef idx="0">
+            <a:schemeClr val="accent1"/>
+          </a:effectRef>
+          <a:fontRef idx="minor">
+            <a:schemeClr val="lt1"/>
+          </a:fontRef>
+        </p:style>
+        <p:txBody>
+          <a:bodyPr wrap="square" rtlCol="0" anchor="ctr">
+            <a:noAutofit/>
+          </a:bodyPr>
+          <a:lstStyle/>
+          <a:p>
+            <a:pPr marL="0" marR="0" lvl="0" indent="0" algn="ctr" defTabSz="914400" rtl="0" eaLnBrk="1" fontAlgn="auto" latinLnBrk="0" hangingPunct="1">
+              <a:lnSpc>
+                <a:spcPct val="100000"/>
+              </a:lnSpc>
+              <a:spcBef>
+                <a:spcPts val="0"/>
+              </a:spcBef>
+              <a:spcAft>
+                <a:spcPts val="0"/>
+              </a:spcAft>
+              <a:buClrTx/>
+              <a:buSzTx/>
+              <a:buFontTx/>
+              <a:buNone/>
+              <a:tabLst/>
+              <a:defRPr/>
+            </a:pPr>
+            <a:endParaRPr kumimoji="0" lang="en-US" sz="1800" b="0" i="0" u="none" strike="noStrike" kern="1200" cap="none" spc="0" normalizeH="0" baseline="0" noProof="0">
+              <a:ln>
+                <a:noFill/>
+              </a:ln>
+              <a:solidFill>
+                <a:prstClr val="white"/>
+              </a:solidFill>
+              <a:effectLst/>
+              <a:uLnTx/>
+              <a:uFillTx/>
+              <a:latin typeface="Calibri" panose="020F0502020204030204"/>
+              <a:ea typeface="+mn-ea"/>
+              <a:cs typeface="+mn-cs"/>
+            </a:endParaRPr>
+          </a:p>
+        </p:txBody>
+      </p:sp>
+      <p:sp useBgFill="1">
+        <p:nvSpPr>
+          <p:cNvPr id="10" name="Freeform: Shape 18">
+            <a:extLst>
+              <a:ext uri="{FF2B5EF4-FFF2-40B4-BE49-F238E27FC236}">
+                <a16:creationId xmlns:a16="http://schemas.microsoft.com/office/drawing/2014/main" id="{216322C2-3CF0-4D33-BF90-3F384CF6D232}"/>
+              </a:ext>
+              <a:ext uri="{C183D7F6-B498-43B3-948B-1728B52AA6E4}">
+                <adec:decorative xmlns:adec="http://schemas.microsoft.com/office/drawing/2017/decorative" val="1"/>
+              </a:ext>
+            </a:extLst>
+          </p:cNvPr>
+          <p:cNvSpPr>
+            <a:spLocks noGrp="1" noRot="1" noChangeAspect="1" noMove="1" noResize="1" noEditPoints="1" noAdjustHandles="1" noChangeArrowheads="1" noChangeShapeType="1" noTextEdit="1"/>
+          </p:cNvSpPr>
+          <p:nvPr>
+            <p:extLst>
+              <p:ext uri="{386F3935-93C4-4BCD-93E2-E3B085C9AB24}">
+                <p16:designElem xmlns:p16="http://schemas.microsoft.com/office/powerpoint/2015/main" val="1"/>
+              </p:ext>
+            </p:extLst>
+          </p:nvPr>
+        </p:nvSpPr>
+        <p:spPr>
+          <a:xfrm>
+            <a:off x="0" y="0"/>
+            <a:ext cx="4446529" cy="6858000"/>
+          </a:xfrm>
+          <a:custGeom>
+            <a:avLst/>
+            <a:gdLst>
+              <a:gd name="connsiteX0" fmla="*/ 0 w 4446529"/>
+              <a:gd name="connsiteY0" fmla="*/ 0 h 6858000"/>
+              <a:gd name="connsiteX1" fmla="*/ 3233551 w 4446529"/>
+              <a:gd name="connsiteY1" fmla="*/ 0 h 6858000"/>
+              <a:gd name="connsiteX2" fmla="*/ 3296534 w 4446529"/>
+              <a:gd name="connsiteY2" fmla="*/ 69271 h 6858000"/>
+              <a:gd name="connsiteX3" fmla="*/ 4446529 w 4446529"/>
+              <a:gd name="connsiteY3" fmla="*/ 3429000 h 6858000"/>
+              <a:gd name="connsiteX4" fmla="*/ 3296534 w 4446529"/>
+              <a:gd name="connsiteY4" fmla="*/ 6788730 h 6858000"/>
+              <a:gd name="connsiteX5" fmla="*/ 3233551 w 4446529"/>
+              <a:gd name="connsiteY5" fmla="*/ 6858000 h 6858000"/>
+              <a:gd name="connsiteX6" fmla="*/ 0 w 4446529"/>
+              <a:gd name="connsiteY6" fmla="*/ 6858000 h 6858000"/>
+            </a:gdLst>
+            <a:ahLst/>
+            <a:cxnLst>
+              <a:cxn ang="0">
+                <a:pos x="connsiteX0" y="connsiteY0"/>
+              </a:cxn>
+              <a:cxn ang="0">
+                <a:pos x="connsiteX1" y="connsiteY1"/>
+              </a:cxn>
+              <a:cxn ang="0">
+                <a:pos x="connsiteX2" y="connsiteY2"/>
+              </a:cxn>
+              <a:cxn ang="0">
+                <a:pos x="connsiteX3" y="connsiteY3"/>
+              </a:cxn>
+              <a:cxn ang="0">
+                <a:pos x="connsiteX4" y="connsiteY4"/>
+              </a:cxn>
+              <a:cxn ang="0">
+                <a:pos x="connsiteX5" y="connsiteY5"/>
+              </a:cxn>
+              <a:cxn ang="0">
+                <a:pos x="connsiteX6" y="connsiteY6"/>
+              </a:cxn>
+            </a:cxnLst>
+            <a:rect l="l" t="t" r="r" b="b"/>
+            <a:pathLst>
+              <a:path w="4446529" h="6858000">
+                <a:moveTo>
+                  <a:pt x="0" y="0"/>
+                </a:moveTo>
+                <a:lnTo>
+                  <a:pt x="3233551" y="0"/>
+                </a:lnTo>
+                <a:lnTo>
+                  <a:pt x="3296534" y="69271"/>
+                </a:lnTo>
+                <a:cubicBezTo>
+                  <a:pt x="4007060" y="929100"/>
+                  <a:pt x="4446529" y="2116944"/>
+                  <a:pt x="4446529" y="3429000"/>
+                </a:cubicBezTo>
+                <a:cubicBezTo>
+                  <a:pt x="4446529" y="4741056"/>
+                  <a:pt x="4007060" y="5928900"/>
+                  <a:pt x="3296534" y="6788730"/>
+                </a:cubicBezTo>
+                <a:lnTo>
+                  <a:pt x="3233551" y="6858000"/>
+                </a:lnTo>
+                <a:lnTo>
+                  <a:pt x="0" y="6858000"/>
+                </a:lnTo>
+                <a:close/>
+              </a:path>
+            </a:pathLst>
+          </a:custGeom>
+          <a:ln w="9525">
+            <a:noFill/>
+          </a:ln>
+          <a:effectLst/>
+        </p:spPr>
+        <p:style>
+          <a:lnRef idx="2">
+            <a:schemeClr val="accent1">
+              <a:shade val="50000"/>
+            </a:schemeClr>
+          </a:lnRef>
+          <a:fillRef idx="1">
+            <a:schemeClr val="accent1"/>
+          </a:fillRef>
+          <a:effectRef idx="0">
+            <a:schemeClr val="accent1"/>
+          </a:effectRef>
+          <a:fontRef idx="minor">
+            <a:schemeClr val="lt1"/>
+          </a:fontRef>
+        </p:style>
+        <p:txBody>
+          <a:bodyPr wrap="square" rtlCol="0" anchor="ctr">
+            <a:noAutofit/>
+          </a:bodyPr>
+          <a:lstStyle/>
+          <a:p>
+            <a:pPr marL="0" marR="0" lvl="0" indent="0" algn="ctr" defTabSz="914400" rtl="0" eaLnBrk="1" fontAlgn="auto" latinLnBrk="0" hangingPunct="1">
+              <a:lnSpc>
+                <a:spcPct val="100000"/>
+              </a:lnSpc>
+              <a:spcBef>
+                <a:spcPts val="0"/>
+              </a:spcBef>
+              <a:spcAft>
+                <a:spcPts val="0"/>
+              </a:spcAft>
+              <a:buClrTx/>
+              <a:buSzTx/>
+              <a:buFontTx/>
+              <a:buNone/>
+              <a:tabLst/>
+              <a:defRPr/>
+            </a:pPr>
+            <a:endParaRPr kumimoji="0" lang="en-US" sz="1800" b="0" i="0" u="none" strike="noStrike" kern="1200" cap="none" spc="0" normalizeH="0" baseline="0" noProof="0">
+              <a:ln>
+                <a:noFill/>
+              </a:ln>
+              <a:solidFill>
+                <a:prstClr val="white"/>
+              </a:solidFill>
+              <a:effectLst/>
+              <a:uLnTx/>
+              <a:uFillTx/>
+              <a:latin typeface="Calibri" panose="020F0502020204030204"/>
+              <a:ea typeface="+mn-ea"/>
+              <a:cs typeface="+mn-cs"/>
+            </a:endParaRPr>
+          </a:p>
+        </p:txBody>
+      </p:sp>
       <p:sp>
         <p:nvSpPr>
           <p:cNvPr id="2" name="Title 1">
@@ -3615,94 +4353,230 @@
             <p:ph type="title"/>
           </p:nvPr>
         </p:nvSpPr>
-        <p:spPr/>
-        <p:txBody>
-          <a:bodyPr/>
-          <a:lstStyle/>
-          <a:p>
-            <a:endParaRPr lang="en-US"/>
+        <p:spPr>
+          <a:xfrm>
+            <a:off x="371094" y="1161288"/>
+            <a:ext cx="3438144" cy="1124712"/>
+          </a:xfrm>
+        </p:spPr>
+        <p:txBody>
+          <a:bodyPr anchor="b">
+            <a:normAutofit fontScale="90000"/>
+          </a:bodyPr>
+          <a:lstStyle/>
+          <a:p>
+            <a:r>
+              <a:rPr lang="en-US" sz="2800" dirty="0"/>
+              <a:t>Collect Stock Quotes and other data from Yahoo! Finance</a:t>
+            </a:r>
+          </a:p>
+        </p:txBody>
+      </p:sp>
+      <p:sp>
+        <p:nvSpPr>
+          <p:cNvPr id="21" name="Rectangle 20">
+            <a:extLst>
+              <a:ext uri="{FF2B5EF4-FFF2-40B4-BE49-F238E27FC236}">
+                <a16:creationId xmlns:a16="http://schemas.microsoft.com/office/drawing/2014/main" id="{55D4142C-5077-457F-A6AD-3FECFDB39685}"/>
+              </a:ext>
+              <a:ext uri="{C183D7F6-B498-43B3-948B-1728B52AA6E4}">
+                <adec:decorative xmlns:adec="http://schemas.microsoft.com/office/drawing/2017/decorative" val="1"/>
+              </a:ext>
+            </a:extLst>
+          </p:cNvPr>
+          <p:cNvSpPr>
+            <a:spLocks noGrp="1" noRot="1" noChangeAspect="1" noMove="1" noResize="1" noEditPoints="1" noAdjustHandles="1" noChangeArrowheads="1" noChangeShapeType="1" noTextEdit="1"/>
+          </p:cNvSpPr>
+          <p:nvPr>
+            <p:extLst>
+              <p:ext uri="{386F3935-93C4-4BCD-93E2-E3B085C9AB24}">
+                <p16:designElem xmlns:p16="http://schemas.microsoft.com/office/powerpoint/2015/main" val="1"/>
+              </p:ext>
+            </p:extLst>
+          </p:nvPr>
+        </p:nvSpPr>
+        <p:spPr>
+          <a:xfrm rot="5400000">
+            <a:off x="662559" y="605790"/>
+            <a:ext cx="73152" cy="548640"/>
+          </a:xfrm>
+          <a:prstGeom prst="rect">
+            <a:avLst/>
+          </a:prstGeom>
+          <a:solidFill>
+            <a:schemeClr val="accent2"/>
+          </a:solidFill>
+          <a:ln>
+            <a:noFill/>
+          </a:ln>
+        </p:spPr>
+        <p:style>
+          <a:lnRef idx="2">
+            <a:schemeClr val="accent1">
+              <a:shade val="50000"/>
+            </a:schemeClr>
+          </a:lnRef>
+          <a:fillRef idx="1">
+            <a:schemeClr val="accent1"/>
+          </a:fillRef>
+          <a:effectRef idx="0">
+            <a:schemeClr val="accent1"/>
+          </a:effectRef>
+          <a:fontRef idx="minor">
+            <a:schemeClr val="lt1"/>
+          </a:fontRef>
+        </p:style>
+        <p:txBody>
+          <a:bodyPr rtlCol="0" anchor="ctr"/>
+          <a:lstStyle/>
+          <a:p>
+            <a:pPr algn="ctr"/>
+            <a:endParaRPr lang="en-US">
+              <a:solidFill>
+                <a:prstClr val="white"/>
+              </a:solidFill>
+              <a:latin typeface="Calibri" panose="020F0502020204030204"/>
+            </a:endParaRPr>
+          </a:p>
+        </p:txBody>
+      </p:sp>
+      <p:sp>
+        <p:nvSpPr>
+          <p:cNvPr id="23" name="Rectangle 22">
+            <a:extLst>
+              <a:ext uri="{FF2B5EF4-FFF2-40B4-BE49-F238E27FC236}">
+                <a16:creationId xmlns:a16="http://schemas.microsoft.com/office/drawing/2014/main" id="{7A5F0580-5EE9-419F-96EE-B6529EF6E7D0}"/>
+              </a:ext>
+              <a:ext uri="{C183D7F6-B498-43B3-948B-1728B52AA6E4}">
+                <adec:decorative xmlns:adec="http://schemas.microsoft.com/office/drawing/2017/decorative" val="1"/>
+              </a:ext>
+            </a:extLst>
+          </p:cNvPr>
+          <p:cNvSpPr>
+            <a:spLocks noGrp="1" noRot="1" noChangeAspect="1" noMove="1" noResize="1" noEditPoints="1" noAdjustHandles="1" noChangeArrowheads="1" noChangeShapeType="1" noTextEdit="1"/>
+          </p:cNvSpPr>
+          <p:nvPr>
+            <p:extLst>
+              <p:ext uri="{386F3935-93C4-4BCD-93E2-E3B085C9AB24}">
+                <p16:designElem xmlns:p16="http://schemas.microsoft.com/office/powerpoint/2015/main" val="1"/>
+              </p:ext>
+            </p:extLst>
+          </p:nvPr>
+        </p:nvSpPr>
+        <p:spPr>
+          <a:xfrm>
+            <a:off x="428244" y="2443480"/>
+            <a:ext cx="3337560" cy="18288"/>
+          </a:xfrm>
+          <a:prstGeom prst="rect">
+            <a:avLst/>
+          </a:prstGeom>
+          <a:solidFill>
+            <a:srgbClr val="D5D5D5"/>
+          </a:solidFill>
+          <a:ln w="3175">
+            <a:noFill/>
+          </a:ln>
+          <a:effectLst/>
+        </p:spPr>
+        <p:style>
+          <a:lnRef idx="2">
+            <a:schemeClr val="accent1">
+              <a:shade val="50000"/>
+            </a:schemeClr>
+          </a:lnRef>
+          <a:fillRef idx="1">
+            <a:schemeClr val="accent1"/>
+          </a:fillRef>
+          <a:effectRef idx="0">
+            <a:schemeClr val="accent1"/>
+          </a:effectRef>
+          <a:fontRef idx="minor">
+            <a:schemeClr val="lt1"/>
+          </a:fontRef>
+        </p:style>
+        <p:txBody>
+          <a:bodyPr rtlCol="0" anchor="ctr"/>
+          <a:lstStyle/>
+          <a:p>
+            <a:pPr algn="ctr"/>
+            <a:endParaRPr lang="en-US">
+              <a:solidFill>
+                <a:prstClr val="white"/>
+              </a:solidFill>
+              <a:latin typeface="Calibri" panose="020F0502020204030204"/>
+            </a:endParaRPr>
+          </a:p>
+        </p:txBody>
+      </p:sp>
+      <p:sp>
+        <p:nvSpPr>
+          <p:cNvPr id="12" name="Content Placeholder 11">
+            <a:extLst>
+              <a:ext uri="{FF2B5EF4-FFF2-40B4-BE49-F238E27FC236}">
+                <a16:creationId xmlns:a16="http://schemas.microsoft.com/office/drawing/2014/main" id="{58A657F7-C688-468D-993D-989A19B7CA3C}"/>
+              </a:ext>
+            </a:extLst>
+          </p:cNvPr>
+          <p:cNvSpPr>
+            <a:spLocks noGrp="1"/>
+          </p:cNvSpPr>
+          <p:nvPr>
+            <p:ph idx="1"/>
+          </p:nvPr>
+        </p:nvSpPr>
+        <p:spPr>
+          <a:xfrm>
+            <a:off x="371094" y="2718054"/>
+            <a:ext cx="3438906" cy="3207258"/>
+          </a:xfrm>
+        </p:spPr>
+        <p:txBody>
+          <a:bodyPr anchor="t">
+            <a:normAutofit/>
+          </a:bodyPr>
+          <a:lstStyle/>
+          <a:p>
+            <a:endParaRPr lang="en-US" sz="1700"/>
           </a:p>
         </p:txBody>
       </p:sp>
       <p:pic>
         <p:nvPicPr>
-          <p:cNvPr id="5" name="Content Placeholder 4">
-            <a:extLst>
-              <a:ext uri="{FF2B5EF4-FFF2-40B4-BE49-F238E27FC236}">
-                <a16:creationId xmlns:a16="http://schemas.microsoft.com/office/drawing/2014/main" id="{1B8CF445-A026-4EB6-A9D9-87DED80E8883}"/>
+          <p:cNvPr id="8" name="Content Placeholder 7" descr="Graphical user interface, application&#10;&#10;Description automatically generated">
+            <a:extLst>
+              <a:ext uri="{FF2B5EF4-FFF2-40B4-BE49-F238E27FC236}">
+                <a16:creationId xmlns:a16="http://schemas.microsoft.com/office/drawing/2014/main" id="{D773B6E0-3D2B-4983-8649-D56B2C77701F}"/>
               </a:ext>
             </a:extLst>
           </p:cNvPr>
           <p:cNvPicPr>
-            <a:picLocks noGrp="1" noChangeAspect="1"/>
+            <a:picLocks noChangeAspect="1"/>
           </p:cNvPicPr>
-          <p:nvPr>
-            <p:ph idx="1"/>
-          </p:nvPr>
+          <p:nvPr/>
         </p:nvPicPr>
         <p:blipFill>
-          <a:blip r:embed="rId2"/>
+          <a:blip r:embed="rId2">
+            <a:extLst>
+              <a:ext uri="{28A0092B-C50C-407E-A947-70E740481C1C}">
+                <a14:useLocalDpi xmlns:a14="http://schemas.microsoft.com/office/drawing/2010/main" val="0"/>
+              </a:ext>
+            </a:extLst>
+          </a:blip>
           <a:stretch>
             <a:fillRect/>
           </a:stretch>
         </p:blipFill>
         <p:spPr>
           <a:xfrm>
-            <a:off x="-208438" y="1027906"/>
-            <a:ext cx="12608876" cy="4315268"/>
-          </a:xfrm>
-        </p:spPr>
-      </p:pic>
-      <p:sp>
-        <p:nvSpPr>
-          <p:cNvPr id="6" name="Rectangle 5">
-            <a:extLst>
-              <a:ext uri="{FF2B5EF4-FFF2-40B4-BE49-F238E27FC236}">
-                <a16:creationId xmlns:a16="http://schemas.microsoft.com/office/drawing/2014/main" id="{AAF16685-77FA-4CBC-B390-046442A79575}"/>
-              </a:ext>
-            </a:extLst>
-          </p:cNvPr>
-          <p:cNvSpPr/>
-          <p:nvPr/>
-        </p:nvSpPr>
-        <p:spPr>
-          <a:xfrm>
-            <a:off x="462427" y="1958342"/>
-            <a:ext cx="8933856" cy="2215991"/>
+            <a:off x="4898967" y="1882922"/>
+            <a:ext cx="6921940" cy="3201397"/>
           </a:xfrm>
           <a:prstGeom prst="rect">
             <a:avLst/>
           </a:prstGeom>
-          <a:noFill/>
         </p:spPr>
-        <p:txBody>
-          <a:bodyPr wrap="none" lIns="91440" tIns="45720" rIns="91440" bIns="45720">
-            <a:spAutoFit/>
-          </a:bodyPr>
-          <a:lstStyle/>
-          <a:p>
-            <a:pPr algn="ctr"/>
-            <a:r>
-              <a:rPr lang="en-US" sz="13800" b="1" cap="none" spc="0" dirty="0">
-                <a:ln w="22225">
-                  <a:solidFill>
-                    <a:schemeClr val="accent2"/>
-                  </a:solidFill>
-                  <a:prstDash val="solid"/>
-                </a:ln>
-                <a:solidFill>
-                  <a:schemeClr val="accent2">
-                    <a:lumMod val="40000"/>
-                    <a:lumOff val="60000"/>
-                  </a:schemeClr>
-                </a:solidFill>
-                <a:effectLst/>
-              </a:rPr>
-              <a:t>Stock Ticker</a:t>
-            </a:r>
-          </a:p>
-        </p:txBody>
-      </p:sp>
+      </p:pic>
     </p:spTree>
     <p:extLst>
       <p:ext uri="{BB962C8B-B14F-4D97-AF65-F5344CB8AC3E}">
@@ -3719,6 +4593,14 @@
 <file path=ppt/slides/slide4.xml><?xml version="1.0" encoding="utf-8"?>
 <p:sld xmlns:a="http://schemas.openxmlformats.org/drawingml/2006/main" xmlns:r="http://schemas.openxmlformats.org/officeDocument/2006/relationships" xmlns:p="http://schemas.openxmlformats.org/presentationml/2006/main">
   <p:cSld>
+    <p:bg>
+      <p:bgPr>
+        <a:solidFill>
+          <a:schemeClr val="bg1"/>
+        </a:solidFill>
+        <a:effectLst/>
+      </p:bgPr>
+    </p:bg>
     <p:spTree>
       <p:nvGrpSpPr>
         <p:cNvPr id="1" name=""/>
@@ -3733,60 +4615,310 @@
           <a:chExt cx="0" cy="0"/>
         </a:xfrm>
       </p:grpSpPr>
-      <p:sp>
-        <p:nvSpPr>
-          <p:cNvPr id="2" name="Title 1">
-            <a:extLst>
-              <a:ext uri="{FF2B5EF4-FFF2-40B4-BE49-F238E27FC236}">
-                <a16:creationId xmlns:a16="http://schemas.microsoft.com/office/drawing/2014/main" id="{EAAAD8DB-A967-4059-94FB-564B1605D449}"/>
-              </a:ext>
-            </a:extLst>
-          </p:cNvPr>
-          <p:cNvSpPr>
-            <a:spLocks noGrp="1"/>
-          </p:cNvSpPr>
-          <p:nvPr>
-            <p:ph type="title"/>
-          </p:nvPr>
-        </p:nvSpPr>
-        <p:spPr/>
-        <p:txBody>
-          <a:bodyPr/>
-          <a:lstStyle/>
-          <a:p>
-            <a:endParaRPr lang="en-US"/>
-          </a:p>
-        </p:txBody>
-      </p:sp>
       <p:pic>
         <p:nvPicPr>
-          <p:cNvPr id="5" name="Content Placeholder 4">
-            <a:extLst>
-              <a:ext uri="{FF2B5EF4-FFF2-40B4-BE49-F238E27FC236}">
-                <a16:creationId xmlns:a16="http://schemas.microsoft.com/office/drawing/2014/main" id="{255753FE-A9EB-4CD1-8AD8-49EAD6CCDBD7}"/>
+          <p:cNvPr id="9" name="Content Placeholder 8" descr="A picture containing text, clock, dark, set&#10;&#10;Description automatically generated">
+            <a:extLst>
+              <a:ext uri="{FF2B5EF4-FFF2-40B4-BE49-F238E27FC236}">
+                <a16:creationId xmlns:a16="http://schemas.microsoft.com/office/drawing/2014/main" id="{54AA8B19-E322-47B4-96FD-F0CE1ED80555}"/>
               </a:ext>
             </a:extLst>
           </p:cNvPr>
           <p:cNvPicPr>
-            <a:picLocks noGrp="1" noChangeAspect="1"/>
+            <a:picLocks noChangeAspect="1"/>
           </p:cNvPicPr>
-          <p:nvPr>
-            <p:ph idx="1"/>
-          </p:nvPr>
+          <p:nvPr/>
         </p:nvPicPr>
-        <p:blipFill>
-          <a:blip r:embed="rId2"/>
-          <a:stretch>
-            <a:fillRect/>
-          </a:stretch>
+        <p:blipFill rotWithShape="1">
+          <a:blip r:embed="rId2">
+            <a:extLst>
+              <a:ext uri="{28A0092B-C50C-407E-A947-70E740481C1C}">
+                <a14:useLocalDpi xmlns:a14="http://schemas.microsoft.com/office/drawing/2010/main" val="0"/>
+              </a:ext>
+            </a:extLst>
+          </a:blip>
+          <a:srcRect l="6443" r="2447" b="1"/>
+          <a:stretch/>
         </p:blipFill>
         <p:spPr>
           <a:xfrm>
-            <a:off x="555225" y="91440"/>
-            <a:ext cx="10798575" cy="6766560"/>
+            <a:off x="-1" y="10"/>
+            <a:ext cx="12192000" cy="6857990"/>
+          </a:xfrm>
+          <a:prstGeom prst="rect">
+            <a:avLst/>
+          </a:prstGeom>
+        </p:spPr>
+      </p:pic>
+      <p:sp>
+        <p:nvSpPr>
+          <p:cNvPr id="16" name="Freeform 5">
+            <a:extLst>
+              <a:ext uri="{FF2B5EF4-FFF2-40B4-BE49-F238E27FC236}">
+                <a16:creationId xmlns:a16="http://schemas.microsoft.com/office/drawing/2014/main" id="{3CD9DF72-87A3-404E-A828-84CBF11A8303}"/>
+              </a:ext>
+              <a:ext uri="{C183D7F6-B498-43B3-948B-1728B52AA6E4}">
+                <adec:decorative xmlns:adec="http://schemas.microsoft.com/office/drawing/2017/decorative" val="1"/>
+              </a:ext>
+            </a:extLst>
+          </p:cNvPr>
+          <p:cNvSpPr>
+            <a:spLocks noGrp="1" noRot="1" noChangeAspect="1" noMove="1" noResize="1" noEditPoints="1" noAdjustHandles="1" noChangeArrowheads="1" noChangeShapeType="1" noTextEdit="1"/>
+          </p:cNvSpPr>
+          <p:nvPr>
+            <p:extLst>
+              <p:ext uri="{386F3935-93C4-4BCD-93E2-E3B085C9AB24}">
+                <p16:designElem xmlns:p16="http://schemas.microsoft.com/office/powerpoint/2015/main" val="1"/>
+              </p:ext>
+            </p:extLst>
+          </p:nvPr>
+        </p:nvSpPr>
+        <p:spPr bwMode="grayWhite">
+          <a:xfrm flipH="1">
+            <a:off x="0" y="998175"/>
+            <a:ext cx="6017172" cy="5859825"/>
+          </a:xfrm>
+          <a:custGeom>
+            <a:avLst/>
+            <a:gdLst>
+              <a:gd name="T0" fmla="*/ 1333 w 1333"/>
+              <a:gd name="T1" fmla="*/ 1031 h 1298"/>
+              <a:gd name="T2" fmla="*/ 1333 w 1333"/>
+              <a:gd name="T3" fmla="*/ 380 h 1298"/>
+              <a:gd name="T4" fmla="*/ 706 w 1333"/>
+              <a:gd name="T5" fmla="*/ 0 h 1298"/>
+              <a:gd name="T6" fmla="*/ 0 w 1333"/>
+              <a:gd name="T7" fmla="*/ 706 h 1298"/>
+              <a:gd name="T8" fmla="*/ 323 w 1333"/>
+              <a:gd name="T9" fmla="*/ 1298 h 1298"/>
+              <a:gd name="T10" fmla="*/ 1090 w 1333"/>
+              <a:gd name="T11" fmla="*/ 1298 h 1298"/>
+              <a:gd name="T12" fmla="*/ 1333 w 1333"/>
+              <a:gd name="T13" fmla="*/ 1031 h 1298"/>
+            </a:gdLst>
+            <a:ahLst/>
+            <a:cxnLst>
+              <a:cxn ang="0">
+                <a:pos x="T0" y="T1"/>
+              </a:cxn>
+              <a:cxn ang="0">
+                <a:pos x="T2" y="T3"/>
+              </a:cxn>
+              <a:cxn ang="0">
+                <a:pos x="T4" y="T5"/>
+              </a:cxn>
+              <a:cxn ang="0">
+                <a:pos x="T6" y="T7"/>
+              </a:cxn>
+              <a:cxn ang="0">
+                <a:pos x="T8" y="T9"/>
+              </a:cxn>
+              <a:cxn ang="0">
+                <a:pos x="T10" y="T11"/>
+              </a:cxn>
+              <a:cxn ang="0">
+                <a:pos x="T12" y="T13"/>
+              </a:cxn>
+            </a:cxnLst>
+            <a:rect l="0" t="0" r="r" b="b"/>
+            <a:pathLst>
+              <a:path w="1333" h="1298">
+                <a:moveTo>
+                  <a:pt x="1333" y="1031"/>
+                </a:moveTo>
+                <a:cubicBezTo>
+                  <a:pt x="1333" y="380"/>
+                  <a:pt x="1333" y="380"/>
+                  <a:pt x="1333" y="380"/>
+                </a:cubicBezTo>
+                <a:cubicBezTo>
+                  <a:pt x="1215" y="154"/>
+                  <a:pt x="979" y="0"/>
+                  <a:pt x="706" y="0"/>
+                </a:cubicBezTo>
+                <a:cubicBezTo>
+                  <a:pt x="317" y="0"/>
+                  <a:pt x="0" y="316"/>
+                  <a:pt x="0" y="706"/>
+                </a:cubicBezTo>
+                <a:cubicBezTo>
+                  <a:pt x="0" y="954"/>
+                  <a:pt x="129" y="1172"/>
+                  <a:pt x="323" y="1298"/>
+                </a:cubicBezTo>
+                <a:cubicBezTo>
+                  <a:pt x="1090" y="1298"/>
+                  <a:pt x="1090" y="1298"/>
+                  <a:pt x="1090" y="1298"/>
+                </a:cubicBezTo>
+                <a:cubicBezTo>
+                  <a:pt x="1193" y="1232"/>
+                  <a:pt x="1276" y="1140"/>
+                  <a:pt x="1333" y="1031"/>
+                </a:cubicBezTo>
+                <a:close/>
+              </a:path>
+            </a:pathLst>
+          </a:custGeom>
+          <a:solidFill>
+            <a:schemeClr val="bg1">
+              <a:alpha val="75000"/>
+            </a:schemeClr>
+          </a:solidFill>
+          <a:ln w="50800" cap="sq" cmpd="dbl">
+            <a:noFill/>
+            <a:miter lim="800000"/>
+          </a:ln>
+          <a:effectLst/>
+        </p:spPr>
+        <p:txBody>
+          <a:bodyPr vert="horz" lIns="91440" tIns="45720" rIns="91440" bIns="45720" rtlCol="0" anchor="t">
+            <a:normAutofit/>
+          </a:bodyPr>
+          <a:lstStyle/>
+          <a:p>
+            <a:pPr algn="ctr">
+              <a:spcAft>
+                <a:spcPts val="1000"/>
+              </a:spcAft>
+              <a:buClr>
+                <a:schemeClr val="tx1"/>
+              </a:buClr>
+              <a:buSzPct val="100000"/>
+              <a:buFont typeface="Arial"/>
+              <a:buNone/>
+            </a:pPr>
+            <a:endParaRPr lang="en-US" sz="1600" cap="all"/>
+          </a:p>
+        </p:txBody>
+      </p:sp>
+      <p:sp>
+        <p:nvSpPr>
+          <p:cNvPr id="2" name="Title 1">
+            <a:extLst>
+              <a:ext uri="{FF2B5EF4-FFF2-40B4-BE49-F238E27FC236}">
+                <a16:creationId xmlns:a16="http://schemas.microsoft.com/office/drawing/2014/main" id="{EAAAD8DB-A967-4059-94FB-564B1605D449}"/>
+              </a:ext>
+            </a:extLst>
+          </p:cNvPr>
+          <p:cNvSpPr>
+            <a:spLocks noGrp="1"/>
+          </p:cNvSpPr>
+          <p:nvPr>
+            <p:ph type="title"/>
+          </p:nvPr>
+        </p:nvSpPr>
+        <p:spPr>
+          <a:xfrm>
+            <a:off x="709448" y="1913950"/>
+            <a:ext cx="4204137" cy="1342754"/>
           </a:xfrm>
         </p:spPr>
-      </p:pic>
+        <p:txBody>
+          <a:bodyPr>
+            <a:normAutofit/>
+          </a:bodyPr>
+          <a:lstStyle/>
+          <a:p>
+            <a:pPr algn="ctr"/>
+            <a:r>
+              <a:rPr lang="en-US" sz="3600" dirty="0"/>
+              <a:t>Display Stock Data on LED Panel</a:t>
+            </a:r>
+          </a:p>
+        </p:txBody>
+      </p:sp>
+      <p:cxnSp>
+        <p:nvCxnSpPr>
+          <p:cNvPr id="18" name="Straight Connector 17">
+            <a:extLst>
+              <a:ext uri="{FF2B5EF4-FFF2-40B4-BE49-F238E27FC236}">
+                <a16:creationId xmlns:a16="http://schemas.microsoft.com/office/drawing/2014/main" id="{20E3A342-4D61-4E3F-AF90-1AB42AEB96CC}"/>
+              </a:ext>
+              <a:ext uri="{C183D7F6-B498-43B3-948B-1728B52AA6E4}">
+                <adec:decorative xmlns:adec="http://schemas.microsoft.com/office/drawing/2017/decorative" val="1"/>
+              </a:ext>
+            </a:extLst>
+          </p:cNvPr>
+          <p:cNvCxnSpPr>
+            <a:cxnSpLocks noGrp="1" noRot="1" noChangeAspect="1" noMove="1" noResize="1" noEditPoints="1" noAdjustHandles="1" noChangeArrowheads="1" noChangeShapeType="1"/>
+          </p:cNvCxnSpPr>
+          <p:nvPr>
+            <p:extLst>
+              <p:ext uri="{386F3935-93C4-4BCD-93E2-E3B085C9AB24}">
+                <p16:designElem xmlns:p16="http://schemas.microsoft.com/office/powerpoint/2015/main" val="1"/>
+              </p:ext>
+            </p:extLst>
+          </p:nvPr>
+        </p:nvCxnSpPr>
+        <p:spPr>
+          <a:xfrm>
+            <a:off x="2287051" y="3337139"/>
+            <a:ext cx="935420" cy="0"/>
+          </a:xfrm>
+          <a:prstGeom prst="line">
+            <a:avLst/>
+          </a:prstGeom>
+          <a:ln w="25400" cap="sq">
+            <a:solidFill>
+              <a:schemeClr val="tx1">
+                <a:lumMod val="85000"/>
+                <a:lumOff val="15000"/>
+              </a:schemeClr>
+            </a:solidFill>
+            <a:bevel/>
+          </a:ln>
+        </p:spPr>
+        <p:style>
+          <a:lnRef idx="1">
+            <a:schemeClr val="accent1"/>
+          </a:lnRef>
+          <a:fillRef idx="0">
+            <a:schemeClr val="accent1"/>
+          </a:fillRef>
+          <a:effectRef idx="0">
+            <a:schemeClr val="accent1"/>
+          </a:effectRef>
+          <a:fontRef idx="minor">
+            <a:schemeClr val="tx1"/>
+          </a:fontRef>
+        </p:style>
+      </p:cxnSp>
+      <p:sp>
+        <p:nvSpPr>
+          <p:cNvPr id="13" name="Content Placeholder 12">
+            <a:extLst>
+              <a:ext uri="{FF2B5EF4-FFF2-40B4-BE49-F238E27FC236}">
+                <a16:creationId xmlns:a16="http://schemas.microsoft.com/office/drawing/2014/main" id="{B222CCCA-30EF-4908-9FDB-F6E9E72E9EC3}"/>
+              </a:ext>
+            </a:extLst>
+          </p:cNvPr>
+          <p:cNvSpPr>
+            <a:spLocks noGrp="1"/>
+          </p:cNvSpPr>
+          <p:nvPr>
+            <p:ph idx="1"/>
+          </p:nvPr>
+        </p:nvSpPr>
+        <p:spPr>
+          <a:xfrm>
+            <a:off x="525516" y="3417573"/>
+            <a:ext cx="4593021" cy="2619839"/>
+          </a:xfrm>
+        </p:spPr>
+        <p:txBody>
+          <a:bodyPr anchor="ctr">
+            <a:normAutofit/>
+          </a:bodyPr>
+          <a:lstStyle/>
+          <a:p>
+            <a:r>
+              <a:rPr lang="en-US" sz="1800" dirty="0"/>
+              <a:t>Different layouts are available</a:t>
+            </a:r>
+          </a:p>
+        </p:txBody>
+      </p:sp>
     </p:spTree>
     <p:extLst>
       <p:ext uri="{BB962C8B-B14F-4D97-AF65-F5344CB8AC3E}">
@@ -3803,6 +4935,14 @@
 <file path=ppt/slides/slide5.xml><?xml version="1.0" encoding="utf-8"?>
 <p:sld xmlns:a="http://schemas.openxmlformats.org/drawingml/2006/main" xmlns:r="http://schemas.openxmlformats.org/officeDocument/2006/relationships" xmlns:p="http://schemas.openxmlformats.org/presentationml/2006/main">
   <p:cSld>
+    <p:bg>
+      <p:bgPr>
+        <a:solidFill>
+          <a:schemeClr val="bg1"/>
+        </a:solidFill>
+        <a:effectLst/>
+      </p:bgPr>
+    </p:bg>
     <p:spTree>
       <p:nvGrpSpPr>
         <p:cNvPr id="1" name=""/>
@@ -3833,12 +4973,22 @@
             <p:ph type="title"/>
           </p:nvPr>
         </p:nvSpPr>
-        <p:spPr/>
-        <p:txBody>
-          <a:bodyPr/>
-          <a:lstStyle/>
-          <a:p>
-            <a:endParaRPr lang="en-US"/>
+        <p:spPr>
+          <a:xfrm>
+            <a:off x="481013" y="3752849"/>
+            <a:ext cx="4812347" cy="2452687"/>
+          </a:xfrm>
+        </p:spPr>
+        <p:txBody>
+          <a:bodyPr anchor="ctr">
+            <a:normAutofit/>
+          </a:bodyPr>
+          <a:lstStyle/>
+          <a:p>
+            <a:r>
+              <a:rPr lang="en-US" sz="3600" dirty="0"/>
+              <a:t>Stock Ticker is Configurable Remotely via a Built-in Web Application</a:t>
+            </a:r>
           </a:p>
         </p:txBody>
       </p:sp>
@@ -3852,25 +5002,86 @@
             </a:extLst>
           </p:cNvPr>
           <p:cNvPicPr>
-            <a:picLocks noGrp="1" noChangeAspect="1"/>
+            <a:picLocks noChangeAspect="1"/>
           </p:cNvPicPr>
-          <p:nvPr>
-            <p:ph idx="1"/>
-          </p:nvPr>
+          <p:nvPr/>
         </p:nvPicPr>
-        <p:blipFill>
+        <p:blipFill rotWithShape="1">
           <a:blip r:embed="rId2"/>
-          <a:stretch>
-            <a:fillRect/>
-          </a:stretch>
+          <a:srcRect t="12736" b="30641"/>
+          <a:stretch/>
         </p:blipFill>
         <p:spPr>
           <a:xfrm>
-            <a:off x="0" y="0"/>
-            <a:ext cx="12782790" cy="6858000"/>
+            <a:off x="20" y="10"/>
+            <a:ext cx="12191980" cy="3710603"/>
+          </a:xfrm>
+          <a:custGeom>
+            <a:avLst/>
+            <a:gdLst/>
+            <a:ahLst/>
+            <a:cxnLst/>
+            <a:rect l="l" t="t" r="r" b="b"/>
+            <a:pathLst>
+              <a:path w="12192000" h="3692092">
+                <a:moveTo>
+                  <a:pt x="0" y="0"/>
+                </a:moveTo>
+                <a:lnTo>
+                  <a:pt x="12192000" y="0"/>
+                </a:lnTo>
+                <a:lnTo>
+                  <a:pt x="12192000" y="3504824"/>
+                </a:lnTo>
+                <a:lnTo>
+                  <a:pt x="12024691" y="3517794"/>
+                </a:lnTo>
+                <a:cubicBezTo>
+                  <a:pt x="8077523" y="3783195"/>
+                  <a:pt x="4094678" y="3026959"/>
+                  <a:pt x="160485" y="3663863"/>
+                </a:cubicBezTo>
+                <a:lnTo>
+                  <a:pt x="0" y="3692092"/>
+                </a:lnTo>
+                <a:close/>
+              </a:path>
+            </a:pathLst>
+          </a:custGeom>
+        </p:spPr>
+      </p:pic>
+      <p:sp>
+        <p:nvSpPr>
+          <p:cNvPr id="9" name="Content Placeholder 8">
+            <a:extLst>
+              <a:ext uri="{FF2B5EF4-FFF2-40B4-BE49-F238E27FC236}">
+                <a16:creationId xmlns:a16="http://schemas.microsoft.com/office/drawing/2014/main" id="{F03C147A-92E9-4D2C-B323-FFA8FAD2715D}"/>
+              </a:ext>
+            </a:extLst>
+          </p:cNvPr>
+          <p:cNvSpPr>
+            <a:spLocks noGrp="1"/>
+          </p:cNvSpPr>
+          <p:nvPr>
+            <p:ph idx="1"/>
+          </p:nvPr>
+        </p:nvSpPr>
+        <p:spPr>
+          <a:xfrm>
+            <a:off x="4223982" y="3752850"/>
+            <a:ext cx="7485413" cy="2452687"/>
           </a:xfrm>
         </p:spPr>
-      </p:pic>
+        <p:txBody>
+          <a:bodyPr anchor="ctr">
+            <a:normAutofit/>
+          </a:bodyPr>
+          <a:lstStyle/>
+          <a:p>
+            <a:endParaRPr lang="en-US" sz="1800"/>
+          </a:p>
+        </p:txBody>
+      </p:sp>
     </p:spTree>
     <p:extLst>
       <p:ext uri="{BB962C8B-B14F-4D97-AF65-F5344CB8AC3E}">

</xml_diff>